<commit_message>
Tweak to lecture 04 slides.
</commit_message>
<xml_diff>
--- a/lectures/lecture04/slides.pptx
+++ b/lectures/lecture04/slides.pptx
@@ -142,6 +142,11 @@
       </a:defRPr>
     </a:lvl9pPr>
   </p:defaultTextStyle>
+  <p:extLst>
+    <p:ext uri="{EFAFB233-063F-42B5-8137-9DF3F51BA10A}">
+      <p15:sldGuideLst xmlns:p15="http://schemas.microsoft.com/office/powerpoint/2012/main"/>
+    </p:ext>
+  </p:extLst>
 </p:presentation>
 </file>
 
@@ -294,7 +299,7 @@
           <a:p>
             <a:fld id="{7FCD48E2-E766-4886-BF0F-4650CE5DC8B0}" type="datetimeFigureOut">
               <a:rPr lang="en-GB" smtClean="0"/>
-              <a:t>25/10/2018</a:t>
+              <a:t>22/01/2019</a:t>
             </a:fld>
             <a:endParaRPr lang="en-GB"/>
           </a:p>
@@ -494,7 +499,7 @@
           <a:p>
             <a:fld id="{7FCD48E2-E766-4886-BF0F-4650CE5DC8B0}" type="datetimeFigureOut">
               <a:rPr lang="en-GB" smtClean="0"/>
-              <a:t>25/10/2018</a:t>
+              <a:t>22/01/2019</a:t>
             </a:fld>
             <a:endParaRPr lang="en-GB"/>
           </a:p>
@@ -704,7 +709,7 @@
           <a:p>
             <a:fld id="{7FCD48E2-E766-4886-BF0F-4650CE5DC8B0}" type="datetimeFigureOut">
               <a:rPr lang="en-GB" smtClean="0"/>
-              <a:t>25/10/2018</a:t>
+              <a:t>22/01/2019</a:t>
             </a:fld>
             <a:endParaRPr lang="en-GB"/>
           </a:p>
@@ -904,7 +909,7 @@
           <a:p>
             <a:fld id="{7FCD48E2-E766-4886-BF0F-4650CE5DC8B0}" type="datetimeFigureOut">
               <a:rPr lang="en-GB" smtClean="0"/>
-              <a:t>25/10/2018</a:t>
+              <a:t>22/01/2019</a:t>
             </a:fld>
             <a:endParaRPr lang="en-GB"/>
           </a:p>
@@ -1180,7 +1185,7 @@
           <a:p>
             <a:fld id="{7FCD48E2-E766-4886-BF0F-4650CE5DC8B0}" type="datetimeFigureOut">
               <a:rPr lang="en-GB" smtClean="0"/>
-              <a:t>25/10/2018</a:t>
+              <a:t>22/01/2019</a:t>
             </a:fld>
             <a:endParaRPr lang="en-GB"/>
           </a:p>
@@ -1448,7 +1453,7 @@
           <a:p>
             <a:fld id="{7FCD48E2-E766-4886-BF0F-4650CE5DC8B0}" type="datetimeFigureOut">
               <a:rPr lang="en-GB" smtClean="0"/>
-              <a:t>25/10/2018</a:t>
+              <a:t>22/01/2019</a:t>
             </a:fld>
             <a:endParaRPr lang="en-GB"/>
           </a:p>
@@ -1863,7 +1868,7 @@
           <a:p>
             <a:fld id="{7FCD48E2-E766-4886-BF0F-4650CE5DC8B0}" type="datetimeFigureOut">
               <a:rPr lang="en-GB" smtClean="0"/>
-              <a:t>25/10/2018</a:t>
+              <a:t>22/01/2019</a:t>
             </a:fld>
             <a:endParaRPr lang="en-GB"/>
           </a:p>
@@ -2005,7 +2010,7 @@
           <a:p>
             <a:fld id="{7FCD48E2-E766-4886-BF0F-4650CE5DC8B0}" type="datetimeFigureOut">
               <a:rPr lang="en-GB" smtClean="0"/>
-              <a:t>25/10/2018</a:t>
+              <a:t>22/01/2019</a:t>
             </a:fld>
             <a:endParaRPr lang="en-GB"/>
           </a:p>
@@ -2118,7 +2123,7 @@
           <a:p>
             <a:fld id="{7FCD48E2-E766-4886-BF0F-4650CE5DC8B0}" type="datetimeFigureOut">
               <a:rPr lang="en-GB" smtClean="0"/>
-              <a:t>25/10/2018</a:t>
+              <a:t>22/01/2019</a:t>
             </a:fld>
             <a:endParaRPr lang="en-GB"/>
           </a:p>
@@ -2431,7 +2436,7 @@
           <a:p>
             <a:fld id="{7FCD48E2-E766-4886-BF0F-4650CE5DC8B0}" type="datetimeFigureOut">
               <a:rPr lang="en-GB" smtClean="0"/>
-              <a:t>25/10/2018</a:t>
+              <a:t>22/01/2019</a:t>
             </a:fld>
             <a:endParaRPr lang="en-GB"/>
           </a:p>
@@ -2720,7 +2725,7 @@
           <a:p>
             <a:fld id="{7FCD48E2-E766-4886-BF0F-4650CE5DC8B0}" type="datetimeFigureOut">
               <a:rPr lang="en-GB" smtClean="0"/>
-              <a:t>25/10/2018</a:t>
+              <a:t>22/01/2019</a:t>
             </a:fld>
             <a:endParaRPr lang="en-GB"/>
           </a:p>
@@ -2963,7 +2968,7 @@
           <a:p>
             <a:fld id="{7FCD48E2-E766-4886-BF0F-4650CE5DC8B0}" type="datetimeFigureOut">
               <a:rPr lang="en-GB" smtClean="0"/>
-              <a:t>25/10/2018</a:t>
+              <a:t>22/01/2019</a:t>
             </a:fld>
             <a:endParaRPr lang="en-GB"/>
           </a:p>
@@ -5491,29 +5496,29 @@
           <a:p>
             <a:pPr marL="0"/>
             <a:r>
-              <a:rPr lang="en-US" sz="2400"/>
+              <a:rPr lang="en-US" sz="2400" dirty="0"/>
               <a:t>Not rushing without thought.</a:t>
             </a:r>
           </a:p>
           <a:p>
             <a:pPr marL="0"/>
-            <a:endParaRPr lang="en-US" sz="2400"/>
+            <a:endParaRPr lang="en-US" sz="2400" dirty="0"/>
           </a:p>
           <a:p>
             <a:pPr marL="0"/>
             <a:r>
-              <a:rPr lang="en-US" sz="2400"/>
-              <a:t>Netflix and Spotify reduced privacy not through price, but by delivering content quickly.</a:t>
+              <a:rPr lang="en-US" sz="2400" dirty="0"/>
+              <a:t>Netflix and Spotify reduced piracy not through price, but by delivering content quickly.</a:t>
             </a:r>
           </a:p>
           <a:p>
             <a:pPr marL="0"/>
-            <a:endParaRPr lang="en-US" sz="2400"/>
+            <a:endParaRPr lang="en-US" sz="2400" dirty="0"/>
           </a:p>
           <a:p>
             <a:pPr marL="0"/>
             <a:r>
-              <a:rPr lang="en-US" sz="2400"/>
+              <a:rPr lang="en-US" sz="2400" dirty="0"/>
               <a:t>Netflix and Spotify deliver movies and music as fast as possible.  People are happy to pay for that.</a:t>
             </a:r>
           </a:p>

</xml_diff>